<commit_message>
final file for presentation
</commit_message>
<xml_diff>
--- a/Report/Genomic data classification - Roei and Bar.pptx
+++ b/Report/Genomic data classification - Roei and Bar.pptx
@@ -22473,7 +22473,7 @@
         </p:nvSpPr>
         <p:spPr>
           <a:xfrm>
-            <a:off x="640889" y="1066161"/>
+            <a:off x="530057" y="1066161"/>
             <a:ext cx="5660814" cy="5427252"/>
           </a:xfrm>
         </p:spPr>
@@ -22503,7 +22503,7 @@
             </a:pPr>
             <a:r>
               <a:rPr lang="en-US" sz="1400" dirty="0"/>
-              <a:t>Training the model over 500 epochs took all night on university servers that held 4 Nvidia 2080Ti GPUS but we finally got our results:</a:t>
+              <a:t>Training the model over 500 epochs took quite some time on university servers that held 4 Nvidia 2080Ti GPUS but we finally   got our results:</a:t>
             </a:r>
           </a:p>
           <a:p>

</xml_diff>